<commit_message>
Add more projects to Lesson 10
</commit_message>
<xml_diff>
--- a/Lesson 10.pptx
+++ b/Lesson 10.pptx
@@ -20,6 +20,14 @@
     <p:sldId id="268" r:id="rId14"/>
     <p:sldId id="269" r:id="rId15"/>
     <p:sldId id="270" r:id="rId16"/>
+    <p:sldId id="272" r:id="rId17"/>
+    <p:sldId id="273" r:id="rId18"/>
+    <p:sldId id="274" r:id="rId19"/>
+    <p:sldId id="275" r:id="rId20"/>
+    <p:sldId id="276" r:id="rId21"/>
+    <p:sldId id="277" r:id="rId22"/>
+    <p:sldId id="278" r:id="rId23"/>
+    <p:sldId id="279" r:id="rId24"/>
   </p:sldIdLst>
   <p:sldSz cx="12192000" cy="6858000"/>
   <p:notesSz cx="6858000" cy="9144000"/>
@@ -221,7 +229,7 @@
           <a:effectLst/>
           <a:extLst>
             <a:ext uri="{91240B29-F687-4f45-9708-019B960494DF}">
-              <a14:hiddenLine xmlns:a14="http://schemas.microsoft.com/office/drawing/2010/main" xmlns="" w="9525">
+              <a14:hiddenLine xmlns="" xmlns:a14="http://schemas.microsoft.com/office/drawing/2010/main" w="9525">
                 <a:solidFill>
                   <a:srgbClr val="000000"/>
                 </a:solidFill>
@@ -413,7 +421,7 @@
           <a:p>
             <a:fld id="{4B11139C-C265-4139-AC99-3E80FFA94C2A}" type="datetimeFigureOut">
               <a:rPr lang="en-US" smtClean="0"/>
-              <a:t>3/16/2024</a:t>
+              <a:t>6/2/2024</a:t>
             </a:fld>
             <a:endParaRPr lang="en-US"/>
           </a:p>
@@ -731,7 +739,7 @@
           <a:p>
             <a:fld id="{4B11139C-C265-4139-AC99-3E80FFA94C2A}" type="datetimeFigureOut">
               <a:rPr lang="en-US" smtClean="0"/>
-              <a:t>3/16/2024</a:t>
+              <a:t>6/2/2024</a:t>
             </a:fld>
             <a:endParaRPr lang="en-US"/>
           </a:p>
@@ -1219,7 +1227,7 @@
           <a:p>
             <a:fld id="{4B11139C-C265-4139-AC99-3E80FFA94C2A}" type="datetimeFigureOut">
               <a:rPr lang="en-US" smtClean="0"/>
-              <a:t>3/16/2024</a:t>
+              <a:t>6/2/2024</a:t>
             </a:fld>
             <a:endParaRPr lang="en-US"/>
           </a:p>
@@ -1588,7 +1596,7 @@
           <a:p>
             <a:fld id="{4B11139C-C265-4139-AC99-3E80FFA94C2A}" type="datetimeFigureOut">
               <a:rPr lang="en-US" smtClean="0"/>
-              <a:t>3/16/2024</a:t>
+              <a:t>6/2/2024</a:t>
             </a:fld>
             <a:endParaRPr lang="en-US"/>
           </a:p>
@@ -1743,7 +1751,7 @@
           <a:ln/>
           <a:extLst>
             <a:ext uri="{91240B29-F687-4f45-9708-019B960494DF}">
-              <a14:hiddenLine xmlns:a14="http://schemas.microsoft.com/office/drawing/2010/main" xmlns="" w="9525">
+              <a14:hiddenLine xmlns="" xmlns:a14="http://schemas.microsoft.com/office/drawing/2010/main" w="9525">
                 <a:solidFill>
                   <a:srgbClr val="000000"/>
                 </a:solidFill>
@@ -1861,7 +1869,7 @@
           <a:p>
             <a:fld id="{4B11139C-C265-4139-AC99-3E80FFA94C2A}" type="datetimeFigureOut">
               <a:rPr lang="en-US" smtClean="0"/>
-              <a:t>3/16/2024</a:t>
+              <a:t>6/2/2024</a:t>
             </a:fld>
             <a:endParaRPr lang="en-US"/>
           </a:p>
@@ -2018,7 +2026,7 @@
           <a:ln/>
           <a:extLst>
             <a:ext uri="{91240B29-F687-4f45-9708-019B960494DF}">
-              <a14:hiddenLine xmlns:a14="http://schemas.microsoft.com/office/drawing/2010/main" xmlns="" w="9525">
+              <a14:hiddenLine xmlns="" xmlns:a14="http://schemas.microsoft.com/office/drawing/2010/main" w="9525">
                 <a:solidFill>
                   <a:srgbClr val="000000"/>
                 </a:solidFill>
@@ -2146,7 +2154,7 @@
           <a:p>
             <a:fld id="{4B11139C-C265-4139-AC99-3E80FFA94C2A}" type="datetimeFigureOut">
               <a:rPr lang="en-US" smtClean="0"/>
-              <a:t>3/16/2024</a:t>
+              <a:t>6/2/2024</a:t>
             </a:fld>
             <a:endParaRPr lang="en-US"/>
           </a:p>
@@ -2301,7 +2309,7 @@
           <a:ln/>
           <a:extLst>
             <a:ext uri="{91240B29-F687-4f45-9708-019B960494DF}">
-              <a14:hiddenLine xmlns:a14="http://schemas.microsoft.com/office/drawing/2010/main" xmlns="" w="9525">
+              <a14:hiddenLine xmlns="" xmlns:a14="http://schemas.microsoft.com/office/drawing/2010/main" w="9525">
                 <a:solidFill>
                   <a:srgbClr val="000000"/>
                 </a:solidFill>
@@ -2429,7 +2437,7 @@
           <a:p>
             <a:fld id="{4B11139C-C265-4139-AC99-3E80FFA94C2A}" type="datetimeFigureOut">
               <a:rPr lang="en-US" smtClean="0"/>
-              <a:t>3/16/2024</a:t>
+              <a:t>6/2/2024</a:t>
             </a:fld>
             <a:endParaRPr lang="en-US"/>
           </a:p>
@@ -2772,7 +2780,7 @@
           <a:p>
             <a:fld id="{4B11139C-C265-4139-AC99-3E80FFA94C2A}" type="datetimeFigureOut">
               <a:rPr lang="en-US" smtClean="0"/>
-              <a:t>3/16/2024</a:t>
+              <a:t>6/2/2024</a:t>
             </a:fld>
             <a:endParaRPr lang="en-US"/>
           </a:p>
@@ -2927,7 +2935,7 @@
           <a:ln/>
           <a:extLst>
             <a:ext uri="{91240B29-F687-4f45-9708-019B960494DF}">
-              <a14:hiddenLine xmlns:a14="http://schemas.microsoft.com/office/drawing/2010/main" xmlns="" w="9525">
+              <a14:hiddenLine xmlns="" xmlns:a14="http://schemas.microsoft.com/office/drawing/2010/main" w="9525">
                 <a:solidFill>
                   <a:srgbClr val="000000"/>
                 </a:solidFill>
@@ -3111,7 +3119,7 @@
           <a:p>
             <a:fld id="{4B11139C-C265-4139-AC99-3E80FFA94C2A}" type="datetimeFigureOut">
               <a:rPr lang="en-US" smtClean="0"/>
-              <a:t>3/16/2024</a:t>
+              <a:t>6/2/2024</a:t>
             </a:fld>
             <a:endParaRPr lang="en-US"/>
           </a:p>
@@ -3266,7 +3274,7 @@
           <a:ln/>
           <a:extLst>
             <a:ext uri="{91240B29-F687-4f45-9708-019B960494DF}">
-              <a14:hiddenLine xmlns:a14="http://schemas.microsoft.com/office/drawing/2010/main" xmlns="" w="9525">
+              <a14:hiddenLine xmlns="" xmlns:a14="http://schemas.microsoft.com/office/drawing/2010/main" w="9525">
                 <a:solidFill>
                   <a:srgbClr val="000000"/>
                 </a:solidFill>
@@ -3588,7 +3596,7 @@
           <a:p>
             <a:fld id="{4B11139C-C265-4139-AC99-3E80FFA94C2A}" type="datetimeFigureOut">
               <a:rPr lang="en-US" smtClean="0"/>
-              <a:t>3/16/2024</a:t>
+              <a:t>6/2/2024</a:t>
             </a:fld>
             <a:endParaRPr lang="en-US"/>
           </a:p>
@@ -3743,7 +3751,7 @@
           <a:ln/>
           <a:extLst>
             <a:ext uri="{91240B29-F687-4f45-9708-019B960494DF}">
-              <a14:hiddenLine xmlns:a14="http://schemas.microsoft.com/office/drawing/2010/main" xmlns="" w="9525">
+              <a14:hiddenLine xmlns="" xmlns:a14="http://schemas.microsoft.com/office/drawing/2010/main" w="9525">
                 <a:solidFill>
                   <a:srgbClr val="000000"/>
                 </a:solidFill>
@@ -3809,7 +3817,7 @@
           <a:p>
             <a:fld id="{4B11139C-C265-4139-AC99-3E80FFA94C2A}" type="datetimeFigureOut">
               <a:rPr lang="en-US" smtClean="0"/>
-              <a:t>3/16/2024</a:t>
+              <a:t>6/2/2024</a:t>
             </a:fld>
             <a:endParaRPr lang="en-US"/>
           </a:p>
@@ -3904,7 +3912,7 @@
           <a:p>
             <a:fld id="{4B11139C-C265-4139-AC99-3E80FFA94C2A}" type="datetimeFigureOut">
               <a:rPr lang="en-US" smtClean="0"/>
-              <a:t>3/16/2024</a:t>
+              <a:t>6/2/2024</a:t>
             </a:fld>
             <a:endParaRPr lang="en-US"/>
           </a:p>
@@ -4172,7 +4180,7 @@
           <a:ln/>
           <a:extLst>
             <a:ext uri="{91240B29-F687-4f45-9708-019B960494DF}">
-              <a14:hiddenLine xmlns:a14="http://schemas.microsoft.com/office/drawing/2010/main" xmlns="" w="9525">
+              <a14:hiddenLine xmlns="" xmlns:a14="http://schemas.microsoft.com/office/drawing/2010/main" w="9525">
                 <a:solidFill>
                   <a:srgbClr val="000000"/>
                 </a:solidFill>
@@ -4371,7 +4379,7 @@
           <a:p>
             <a:fld id="{4B11139C-C265-4139-AC99-3E80FFA94C2A}" type="datetimeFigureOut">
               <a:rPr lang="en-US" smtClean="0"/>
-              <a:t>3/16/2024</a:t>
+              <a:t>6/2/2024</a:t>
             </a:fld>
             <a:endParaRPr lang="en-US"/>
           </a:p>
@@ -4684,7 +4692,7 @@
           <a:p>
             <a:fld id="{4B11139C-C265-4139-AC99-3E80FFA94C2A}" type="datetimeFigureOut">
               <a:rPr lang="en-US" smtClean="0"/>
-              <a:t>3/16/2024</a:t>
+              <a:t>6/2/2024</a:t>
             </a:fld>
             <a:endParaRPr lang="en-US"/>
           </a:p>
@@ -4954,7 +4962,7 @@
           <a:p>
             <a:fld id="{4B11139C-C265-4139-AC99-3E80FFA94C2A}" type="datetimeFigureOut">
               <a:rPr lang="en-US" smtClean="0"/>
-              <a:t>3/16/2024</a:t>
+              <a:t>6/2/2024</a:t>
             </a:fld>
             <a:endParaRPr lang="en-US"/>
           </a:p>
@@ -5508,8 +5516,8 @@
         </p:nvSpPr>
         <p:spPr>
           <a:xfrm>
-            <a:off x="2750495" y="2766218"/>
-            <a:ext cx="6691009" cy="1325563"/>
+            <a:off x="322634" y="2766218"/>
+            <a:ext cx="11546732" cy="1325563"/>
           </a:xfrm>
         </p:spPr>
         <p:txBody>
@@ -5519,7 +5527,7 @@
             <a:pPr algn="ctr"/>
             <a:r>
               <a:rPr lang="en-US" dirty="0"/>
-              <a:t>Project 4. Mad Libs Game</a:t>
+              <a:t>Project 4. Simple Text-Based Adventure Game</a:t>
             </a:r>
           </a:p>
         </p:txBody>
@@ -5600,8 +5608,8 @@
         </p:nvSpPr>
         <p:spPr>
           <a:xfrm>
-            <a:off x="838200" y="2766218"/>
-            <a:ext cx="10515600" cy="1325563"/>
+            <a:off x="838200" y="2607012"/>
+            <a:ext cx="10515600" cy="1643975"/>
           </a:xfrm>
         </p:spPr>
         <p:txBody>
@@ -5613,7 +5621,7 @@
             </a:pPr>
             <a:r>
               <a:rPr lang="en-US" dirty="0"/>
-              <a:t>This project combines basic string manipulation with user input. Children fill in the blanks of a story with their own words.</a:t>
+              <a:t>Develop a text-based adventure game where the player makes choices to navigate through different scenarios and reach an end goal.</a:t>
             </a:r>
           </a:p>
         </p:txBody>
@@ -5677,7 +5685,7 @@
             <a:pPr algn="ctr"/>
             <a:r>
               <a:rPr lang="en-US" dirty="0"/>
-              <a:t>Project 5. Hangman Game</a:t>
+              <a:t>Project 5. BMI Calculator</a:t>
             </a:r>
           </a:p>
         </p:txBody>
@@ -5771,7 +5779,7 @@
             </a:pPr>
             <a:r>
               <a:rPr lang="en-US" dirty="0"/>
-              <a:t>This project introduces string manipulation and loops. Children guess letters to uncover a hidden word.</a:t>
+              <a:t>Create a program that calculates and displays the Body Mass Index (BMI) based on the user's height and weight.</a:t>
             </a:r>
           </a:p>
         </p:txBody>
@@ -5947,6 +5955,322 @@
 </p:sld>
 </file>
 
+<file path=ppt/slides/slide16.xml><?xml version="1.0" encoding="utf-8"?>
+<p:sld xmlns:a="http://schemas.openxmlformats.org/drawingml/2006/main" xmlns:r="http://schemas.openxmlformats.org/officeDocument/2006/relationships" xmlns:p="http://schemas.openxmlformats.org/presentationml/2006/main">
+  <p:cSld>
+    <p:spTree>
+      <p:nvGrpSpPr>
+        <p:cNvPr id="1" name=""/>
+        <p:cNvGrpSpPr/>
+        <p:nvPr/>
+      </p:nvGrpSpPr>
+      <p:grpSpPr>
+        <a:xfrm>
+          <a:off x="0" y="0"/>
+          <a:ext cx="0" cy="0"/>
+          <a:chOff x="0" y="0"/>
+          <a:chExt cx="0" cy="0"/>
+        </a:xfrm>
+      </p:grpSpPr>
+      <p:sp>
+        <p:nvSpPr>
+          <p:cNvPr id="2" name="Title 1">
+            <a:extLst>
+              <a:ext uri="{FF2B5EF4-FFF2-40B4-BE49-F238E27FC236}">
+                <a16:creationId xmlns:a16="http://schemas.microsoft.com/office/drawing/2014/main" id="{3DCE5DB4-1FEA-DD81-6F49-DE1CC66BB628}"/>
+              </a:ext>
+            </a:extLst>
+          </p:cNvPr>
+          <p:cNvSpPr>
+            <a:spLocks noGrp="1"/>
+          </p:cNvSpPr>
+          <p:nvPr>
+            <p:ph type="title"/>
+          </p:nvPr>
+        </p:nvSpPr>
+        <p:spPr>
+          <a:xfrm>
+            <a:off x="1358832" y="2766218"/>
+            <a:ext cx="9474335" cy="1325563"/>
+          </a:xfrm>
+        </p:spPr>
+        <p:txBody>
+          <a:bodyPr/>
+          <a:lstStyle/>
+          <a:p>
+            <a:pPr algn="ctr"/>
+            <a:r>
+              <a:rPr lang="en-US" dirty="0"/>
+              <a:t>Project 7. Rock, Paper, Scissors Game</a:t>
+            </a:r>
+          </a:p>
+        </p:txBody>
+      </p:sp>
+    </p:spTree>
+    <p:extLst>
+      <p:ext uri="{BB962C8B-B14F-4D97-AF65-F5344CB8AC3E}">
+        <p14:creationId xmlns:p14="http://schemas.microsoft.com/office/powerpoint/2010/main" val="1033427230"/>
+      </p:ext>
+    </p:extLst>
+  </p:cSld>
+  <p:clrMapOvr>
+    <a:masterClrMapping/>
+  </p:clrMapOvr>
+</p:sld>
+</file>
+
+<file path=ppt/slides/slide17.xml><?xml version="1.0" encoding="utf-8"?>
+<p:sld xmlns:a="http://schemas.openxmlformats.org/drawingml/2006/main" xmlns:r="http://schemas.openxmlformats.org/officeDocument/2006/relationships" xmlns:p="http://schemas.openxmlformats.org/presentationml/2006/main">
+  <p:cSld>
+    <p:spTree>
+      <p:nvGrpSpPr>
+        <p:cNvPr id="1" name=""/>
+        <p:cNvGrpSpPr/>
+        <p:nvPr/>
+      </p:nvGrpSpPr>
+      <p:grpSpPr>
+        <a:xfrm>
+          <a:off x="0" y="0"/>
+          <a:ext cx="0" cy="0"/>
+          <a:chOff x="0" y="0"/>
+          <a:chExt cx="0" cy="0"/>
+        </a:xfrm>
+      </p:grpSpPr>
+      <p:sp>
+        <p:nvSpPr>
+          <p:cNvPr id="2" name="Title 1">
+            <a:extLst>
+              <a:ext uri="{FF2B5EF4-FFF2-40B4-BE49-F238E27FC236}">
+                <a16:creationId xmlns:a16="http://schemas.microsoft.com/office/drawing/2014/main" id="{1B44277E-E34B-0132-200E-1D7591795F1B}"/>
+              </a:ext>
+            </a:extLst>
+          </p:cNvPr>
+          <p:cNvSpPr>
+            <a:spLocks noGrp="1"/>
+          </p:cNvSpPr>
+          <p:nvPr>
+            <p:ph type="title"/>
+          </p:nvPr>
+        </p:nvSpPr>
+        <p:spPr/>
+        <p:txBody>
+          <a:bodyPr/>
+          <a:lstStyle/>
+          <a:p>
+            <a:r>
+              <a:rPr lang="en-US" dirty="0"/>
+              <a:t>Project Description:</a:t>
+            </a:r>
+          </a:p>
+        </p:txBody>
+      </p:sp>
+      <p:sp>
+        <p:nvSpPr>
+          <p:cNvPr id="3" name="Content Placeholder 2">
+            <a:extLst>
+              <a:ext uri="{FF2B5EF4-FFF2-40B4-BE49-F238E27FC236}">
+                <a16:creationId xmlns:a16="http://schemas.microsoft.com/office/drawing/2014/main" id="{8B4FE5F1-A08A-CC88-20A0-D8DD4E087D2E}"/>
+              </a:ext>
+            </a:extLst>
+          </p:cNvPr>
+          <p:cNvSpPr>
+            <a:spLocks noGrp="1"/>
+          </p:cNvSpPr>
+          <p:nvPr>
+            <p:ph idx="1"/>
+          </p:nvPr>
+        </p:nvSpPr>
+        <p:spPr>
+          <a:xfrm>
+            <a:off x="838200" y="2766218"/>
+            <a:ext cx="10515600" cy="1325563"/>
+          </a:xfrm>
+        </p:spPr>
+        <p:txBody>
+          <a:bodyPr/>
+          <a:lstStyle/>
+          <a:p>
+            <a:pPr marL="0" indent="0">
+              <a:buNone/>
+            </a:pPr>
+            <a:r>
+              <a:rPr lang="en-US" dirty="0"/>
+              <a:t>Create a Rock, Paper, Scissors game where the user plays against the computer. The computer's choice should be random.</a:t>
+            </a:r>
+          </a:p>
+        </p:txBody>
+      </p:sp>
+    </p:spTree>
+    <p:extLst>
+      <p:ext uri="{BB962C8B-B14F-4D97-AF65-F5344CB8AC3E}">
+        <p14:creationId xmlns:p14="http://schemas.microsoft.com/office/powerpoint/2010/main" val="2364200780"/>
+      </p:ext>
+    </p:extLst>
+  </p:cSld>
+  <p:clrMapOvr>
+    <a:masterClrMapping/>
+  </p:clrMapOvr>
+</p:sld>
+</file>
+
+<file path=ppt/slides/slide18.xml><?xml version="1.0" encoding="utf-8"?>
+<p:sld xmlns:a="http://schemas.openxmlformats.org/drawingml/2006/main" xmlns:r="http://schemas.openxmlformats.org/officeDocument/2006/relationships" xmlns:p="http://schemas.openxmlformats.org/presentationml/2006/main">
+  <p:cSld>
+    <p:spTree>
+      <p:nvGrpSpPr>
+        <p:cNvPr id="1" name=""/>
+        <p:cNvGrpSpPr/>
+        <p:nvPr/>
+      </p:nvGrpSpPr>
+      <p:grpSpPr>
+        <a:xfrm>
+          <a:off x="0" y="0"/>
+          <a:ext cx="0" cy="0"/>
+          <a:chOff x="0" y="0"/>
+          <a:chExt cx="0" cy="0"/>
+        </a:xfrm>
+      </p:grpSpPr>
+      <p:sp>
+        <p:nvSpPr>
+          <p:cNvPr id="2" name="Title 1">
+            <a:extLst>
+              <a:ext uri="{FF2B5EF4-FFF2-40B4-BE49-F238E27FC236}">
+                <a16:creationId xmlns:a16="http://schemas.microsoft.com/office/drawing/2014/main" id="{3DCE5DB4-1FEA-DD81-6F49-DE1CC66BB628}"/>
+              </a:ext>
+            </a:extLst>
+          </p:cNvPr>
+          <p:cNvSpPr>
+            <a:spLocks noGrp="1"/>
+          </p:cNvSpPr>
+          <p:nvPr>
+            <p:ph type="title"/>
+          </p:nvPr>
+        </p:nvSpPr>
+        <p:spPr>
+          <a:xfrm>
+            <a:off x="2072092" y="2766218"/>
+            <a:ext cx="8047815" cy="1325563"/>
+          </a:xfrm>
+        </p:spPr>
+        <p:txBody>
+          <a:bodyPr/>
+          <a:lstStyle/>
+          <a:p>
+            <a:pPr algn="ctr"/>
+            <a:r>
+              <a:rPr lang="en-US" dirty="0"/>
+              <a:t>Project 8. Password Generator</a:t>
+            </a:r>
+          </a:p>
+        </p:txBody>
+      </p:sp>
+    </p:spTree>
+    <p:extLst>
+      <p:ext uri="{BB962C8B-B14F-4D97-AF65-F5344CB8AC3E}">
+        <p14:creationId xmlns:p14="http://schemas.microsoft.com/office/powerpoint/2010/main" val="494670810"/>
+      </p:ext>
+    </p:extLst>
+  </p:cSld>
+  <p:clrMapOvr>
+    <a:masterClrMapping/>
+  </p:clrMapOvr>
+</p:sld>
+</file>
+
+<file path=ppt/slides/slide19.xml><?xml version="1.0" encoding="utf-8"?>
+<p:sld xmlns:a="http://schemas.openxmlformats.org/drawingml/2006/main" xmlns:r="http://schemas.openxmlformats.org/officeDocument/2006/relationships" xmlns:p="http://schemas.openxmlformats.org/presentationml/2006/main">
+  <p:cSld>
+    <p:spTree>
+      <p:nvGrpSpPr>
+        <p:cNvPr id="1" name=""/>
+        <p:cNvGrpSpPr/>
+        <p:nvPr/>
+      </p:nvGrpSpPr>
+      <p:grpSpPr>
+        <a:xfrm>
+          <a:off x="0" y="0"/>
+          <a:ext cx="0" cy="0"/>
+          <a:chOff x="0" y="0"/>
+          <a:chExt cx="0" cy="0"/>
+        </a:xfrm>
+      </p:grpSpPr>
+      <p:sp>
+        <p:nvSpPr>
+          <p:cNvPr id="2" name="Title 1">
+            <a:extLst>
+              <a:ext uri="{FF2B5EF4-FFF2-40B4-BE49-F238E27FC236}">
+                <a16:creationId xmlns:a16="http://schemas.microsoft.com/office/drawing/2014/main" id="{1B44277E-E34B-0132-200E-1D7591795F1B}"/>
+              </a:ext>
+            </a:extLst>
+          </p:cNvPr>
+          <p:cNvSpPr>
+            <a:spLocks noGrp="1"/>
+          </p:cNvSpPr>
+          <p:nvPr>
+            <p:ph type="title"/>
+          </p:nvPr>
+        </p:nvSpPr>
+        <p:spPr/>
+        <p:txBody>
+          <a:bodyPr/>
+          <a:lstStyle/>
+          <a:p>
+            <a:r>
+              <a:rPr lang="en-US" dirty="0"/>
+              <a:t>Project Description:</a:t>
+            </a:r>
+          </a:p>
+        </p:txBody>
+      </p:sp>
+      <p:sp>
+        <p:nvSpPr>
+          <p:cNvPr id="3" name="Content Placeholder 2">
+            <a:extLst>
+              <a:ext uri="{FF2B5EF4-FFF2-40B4-BE49-F238E27FC236}">
+                <a16:creationId xmlns:a16="http://schemas.microsoft.com/office/drawing/2014/main" id="{8B4FE5F1-A08A-CC88-20A0-D8DD4E087D2E}"/>
+              </a:ext>
+            </a:extLst>
+          </p:cNvPr>
+          <p:cNvSpPr>
+            <a:spLocks noGrp="1"/>
+          </p:cNvSpPr>
+          <p:nvPr>
+            <p:ph idx="1"/>
+          </p:nvPr>
+        </p:nvSpPr>
+        <p:spPr>
+          <a:xfrm>
+            <a:off x="838200" y="2766218"/>
+            <a:ext cx="10515600" cy="1325563"/>
+          </a:xfrm>
+        </p:spPr>
+        <p:txBody>
+          <a:bodyPr/>
+          <a:lstStyle/>
+          <a:p>
+            <a:pPr marL="0" indent="0">
+              <a:buNone/>
+            </a:pPr>
+            <a:r>
+              <a:rPr lang="en-US" dirty="0"/>
+              <a:t>Build a password generator that creates a strong password based on user-defined criteria such as length and character types (letters, digits, symbols).</a:t>
+            </a:r>
+          </a:p>
+        </p:txBody>
+      </p:sp>
+    </p:spTree>
+    <p:extLst>
+      <p:ext uri="{BB962C8B-B14F-4D97-AF65-F5344CB8AC3E}">
+        <p14:creationId xmlns:p14="http://schemas.microsoft.com/office/powerpoint/2010/main" val="3840435107"/>
+      </p:ext>
+    </p:extLst>
+  </p:cSld>
+  <p:clrMapOvr>
+    <a:masterClrMapping/>
+  </p:clrMapOvr>
+</p:sld>
+</file>
+
 <file path=ppt/slides/slide2.xml><?xml version="1.0" encoding="utf-8"?>
 <p:sld xmlns:a="http://schemas.openxmlformats.org/drawingml/2006/main" xmlns:r="http://schemas.openxmlformats.org/officeDocument/2006/relationships" xmlns:p="http://schemas.openxmlformats.org/presentationml/2006/main">
   <p:cSld>
@@ -6028,6 +6352,322 @@
     <p:extLst>
       <p:ext uri="{BB962C8B-B14F-4D97-AF65-F5344CB8AC3E}">
         <p14:creationId xmlns:p14="http://schemas.microsoft.com/office/powerpoint/2010/main" val="3003746695"/>
+      </p:ext>
+    </p:extLst>
+  </p:cSld>
+  <p:clrMapOvr>
+    <a:masterClrMapping/>
+  </p:clrMapOvr>
+</p:sld>
+</file>
+
+<file path=ppt/slides/slide20.xml><?xml version="1.0" encoding="utf-8"?>
+<p:sld xmlns:a="http://schemas.openxmlformats.org/drawingml/2006/main" xmlns:r="http://schemas.openxmlformats.org/officeDocument/2006/relationships" xmlns:p="http://schemas.openxmlformats.org/presentationml/2006/main">
+  <p:cSld>
+    <p:spTree>
+      <p:nvGrpSpPr>
+        <p:cNvPr id="1" name=""/>
+        <p:cNvGrpSpPr/>
+        <p:nvPr/>
+      </p:nvGrpSpPr>
+      <p:grpSpPr>
+        <a:xfrm>
+          <a:off x="0" y="0"/>
+          <a:ext cx="0" cy="0"/>
+          <a:chOff x="0" y="0"/>
+          <a:chExt cx="0" cy="0"/>
+        </a:xfrm>
+      </p:grpSpPr>
+      <p:sp>
+        <p:nvSpPr>
+          <p:cNvPr id="2" name="Title 1">
+            <a:extLst>
+              <a:ext uri="{FF2B5EF4-FFF2-40B4-BE49-F238E27FC236}">
+                <a16:creationId xmlns:a16="http://schemas.microsoft.com/office/drawing/2014/main" id="{3DCE5DB4-1FEA-DD81-6F49-DE1CC66BB628}"/>
+              </a:ext>
+            </a:extLst>
+          </p:cNvPr>
+          <p:cNvSpPr>
+            <a:spLocks noGrp="1"/>
+          </p:cNvSpPr>
+          <p:nvPr>
+            <p:ph type="title"/>
+          </p:nvPr>
+        </p:nvSpPr>
+        <p:spPr>
+          <a:xfrm>
+            <a:off x="2876195" y="2766218"/>
+            <a:ext cx="6439610" cy="1325563"/>
+          </a:xfrm>
+        </p:spPr>
+        <p:txBody>
+          <a:bodyPr/>
+          <a:lstStyle/>
+          <a:p>
+            <a:pPr algn="ctr"/>
+            <a:r>
+              <a:rPr lang="en-US" dirty="0"/>
+              <a:t>Project 9. Contact Book</a:t>
+            </a:r>
+          </a:p>
+        </p:txBody>
+      </p:sp>
+    </p:spTree>
+    <p:extLst>
+      <p:ext uri="{BB962C8B-B14F-4D97-AF65-F5344CB8AC3E}">
+        <p14:creationId xmlns:p14="http://schemas.microsoft.com/office/powerpoint/2010/main" val="335665352"/>
+      </p:ext>
+    </p:extLst>
+  </p:cSld>
+  <p:clrMapOvr>
+    <a:masterClrMapping/>
+  </p:clrMapOvr>
+</p:sld>
+</file>
+
+<file path=ppt/slides/slide21.xml><?xml version="1.0" encoding="utf-8"?>
+<p:sld xmlns:a="http://schemas.openxmlformats.org/drawingml/2006/main" xmlns:r="http://schemas.openxmlformats.org/officeDocument/2006/relationships" xmlns:p="http://schemas.openxmlformats.org/presentationml/2006/main">
+  <p:cSld>
+    <p:spTree>
+      <p:nvGrpSpPr>
+        <p:cNvPr id="1" name=""/>
+        <p:cNvGrpSpPr/>
+        <p:nvPr/>
+      </p:nvGrpSpPr>
+      <p:grpSpPr>
+        <a:xfrm>
+          <a:off x="0" y="0"/>
+          <a:ext cx="0" cy="0"/>
+          <a:chOff x="0" y="0"/>
+          <a:chExt cx="0" cy="0"/>
+        </a:xfrm>
+      </p:grpSpPr>
+      <p:sp>
+        <p:nvSpPr>
+          <p:cNvPr id="2" name="Title 1">
+            <a:extLst>
+              <a:ext uri="{FF2B5EF4-FFF2-40B4-BE49-F238E27FC236}">
+                <a16:creationId xmlns:a16="http://schemas.microsoft.com/office/drawing/2014/main" id="{1B44277E-E34B-0132-200E-1D7591795F1B}"/>
+              </a:ext>
+            </a:extLst>
+          </p:cNvPr>
+          <p:cNvSpPr>
+            <a:spLocks noGrp="1"/>
+          </p:cNvSpPr>
+          <p:nvPr>
+            <p:ph type="title"/>
+          </p:nvPr>
+        </p:nvSpPr>
+        <p:spPr/>
+        <p:txBody>
+          <a:bodyPr/>
+          <a:lstStyle/>
+          <a:p>
+            <a:r>
+              <a:rPr lang="en-US" dirty="0"/>
+              <a:t>Project Description:</a:t>
+            </a:r>
+          </a:p>
+        </p:txBody>
+      </p:sp>
+      <p:sp>
+        <p:nvSpPr>
+          <p:cNvPr id="3" name="Content Placeholder 2">
+            <a:extLst>
+              <a:ext uri="{FF2B5EF4-FFF2-40B4-BE49-F238E27FC236}">
+                <a16:creationId xmlns:a16="http://schemas.microsoft.com/office/drawing/2014/main" id="{8B4FE5F1-A08A-CC88-20A0-D8DD4E087D2E}"/>
+              </a:ext>
+            </a:extLst>
+          </p:cNvPr>
+          <p:cNvSpPr>
+            <a:spLocks noGrp="1"/>
+          </p:cNvSpPr>
+          <p:nvPr>
+            <p:ph idx="1"/>
+          </p:nvPr>
+        </p:nvSpPr>
+        <p:spPr>
+          <a:xfrm>
+            <a:off x="838200" y="2766218"/>
+            <a:ext cx="10515600" cy="1325563"/>
+          </a:xfrm>
+        </p:spPr>
+        <p:txBody>
+          <a:bodyPr/>
+          <a:lstStyle/>
+          <a:p>
+            <a:pPr marL="0" indent="0">
+              <a:buNone/>
+            </a:pPr>
+            <a:r>
+              <a:rPr lang="en-US" dirty="0"/>
+              <a:t>Create a contact book where users can add, view, and delete contacts. Each contact should have a name and a phone number.</a:t>
+            </a:r>
+          </a:p>
+        </p:txBody>
+      </p:sp>
+    </p:spTree>
+    <p:extLst>
+      <p:ext uri="{BB962C8B-B14F-4D97-AF65-F5344CB8AC3E}">
+        <p14:creationId xmlns:p14="http://schemas.microsoft.com/office/powerpoint/2010/main" val="2250837821"/>
+      </p:ext>
+    </p:extLst>
+  </p:cSld>
+  <p:clrMapOvr>
+    <a:masterClrMapping/>
+  </p:clrMapOvr>
+</p:sld>
+</file>
+
+<file path=ppt/slides/slide22.xml><?xml version="1.0" encoding="utf-8"?>
+<p:sld xmlns:a="http://schemas.openxmlformats.org/drawingml/2006/main" xmlns:r="http://schemas.openxmlformats.org/officeDocument/2006/relationships" xmlns:p="http://schemas.openxmlformats.org/presentationml/2006/main">
+  <p:cSld>
+    <p:spTree>
+      <p:nvGrpSpPr>
+        <p:cNvPr id="1" name=""/>
+        <p:cNvGrpSpPr/>
+        <p:nvPr/>
+      </p:nvGrpSpPr>
+      <p:grpSpPr>
+        <a:xfrm>
+          <a:off x="0" y="0"/>
+          <a:ext cx="0" cy="0"/>
+          <a:chOff x="0" y="0"/>
+          <a:chExt cx="0" cy="0"/>
+        </a:xfrm>
+      </p:grpSpPr>
+      <p:sp>
+        <p:nvSpPr>
+          <p:cNvPr id="2" name="Title 1">
+            <a:extLst>
+              <a:ext uri="{FF2B5EF4-FFF2-40B4-BE49-F238E27FC236}">
+                <a16:creationId xmlns:a16="http://schemas.microsoft.com/office/drawing/2014/main" id="{3DCE5DB4-1FEA-DD81-6F49-DE1CC66BB628}"/>
+              </a:ext>
+            </a:extLst>
+          </p:cNvPr>
+          <p:cNvSpPr>
+            <a:spLocks noGrp="1"/>
+          </p:cNvSpPr>
+          <p:nvPr>
+            <p:ph type="title"/>
+          </p:nvPr>
+        </p:nvSpPr>
+        <p:spPr>
+          <a:xfrm>
+            <a:off x="3015599" y="2766218"/>
+            <a:ext cx="6160801" cy="1325563"/>
+          </a:xfrm>
+        </p:spPr>
+        <p:txBody>
+          <a:bodyPr/>
+          <a:lstStyle/>
+          <a:p>
+            <a:pPr algn="ctr"/>
+            <a:r>
+              <a:rPr lang="en-US" dirty="0"/>
+              <a:t>Project 10. Simple Quiz</a:t>
+            </a:r>
+          </a:p>
+        </p:txBody>
+      </p:sp>
+    </p:spTree>
+    <p:extLst>
+      <p:ext uri="{BB962C8B-B14F-4D97-AF65-F5344CB8AC3E}">
+        <p14:creationId xmlns:p14="http://schemas.microsoft.com/office/powerpoint/2010/main" val="1703743468"/>
+      </p:ext>
+    </p:extLst>
+  </p:cSld>
+  <p:clrMapOvr>
+    <a:masterClrMapping/>
+  </p:clrMapOvr>
+</p:sld>
+</file>
+
+<file path=ppt/slides/slide23.xml><?xml version="1.0" encoding="utf-8"?>
+<p:sld xmlns:a="http://schemas.openxmlformats.org/drawingml/2006/main" xmlns:r="http://schemas.openxmlformats.org/officeDocument/2006/relationships" xmlns:p="http://schemas.openxmlformats.org/presentationml/2006/main">
+  <p:cSld>
+    <p:spTree>
+      <p:nvGrpSpPr>
+        <p:cNvPr id="1" name=""/>
+        <p:cNvGrpSpPr/>
+        <p:nvPr/>
+      </p:nvGrpSpPr>
+      <p:grpSpPr>
+        <a:xfrm>
+          <a:off x="0" y="0"/>
+          <a:ext cx="0" cy="0"/>
+          <a:chOff x="0" y="0"/>
+          <a:chExt cx="0" cy="0"/>
+        </a:xfrm>
+      </p:grpSpPr>
+      <p:sp>
+        <p:nvSpPr>
+          <p:cNvPr id="2" name="Title 1">
+            <a:extLst>
+              <a:ext uri="{FF2B5EF4-FFF2-40B4-BE49-F238E27FC236}">
+                <a16:creationId xmlns:a16="http://schemas.microsoft.com/office/drawing/2014/main" id="{1B44277E-E34B-0132-200E-1D7591795F1B}"/>
+              </a:ext>
+            </a:extLst>
+          </p:cNvPr>
+          <p:cNvSpPr>
+            <a:spLocks noGrp="1"/>
+          </p:cNvSpPr>
+          <p:nvPr>
+            <p:ph type="title"/>
+          </p:nvPr>
+        </p:nvSpPr>
+        <p:spPr/>
+        <p:txBody>
+          <a:bodyPr/>
+          <a:lstStyle/>
+          <a:p>
+            <a:r>
+              <a:rPr lang="en-US" dirty="0"/>
+              <a:t>Project Description:</a:t>
+            </a:r>
+          </a:p>
+        </p:txBody>
+      </p:sp>
+      <p:sp>
+        <p:nvSpPr>
+          <p:cNvPr id="3" name="Content Placeholder 2">
+            <a:extLst>
+              <a:ext uri="{FF2B5EF4-FFF2-40B4-BE49-F238E27FC236}">
+                <a16:creationId xmlns:a16="http://schemas.microsoft.com/office/drawing/2014/main" id="{8B4FE5F1-A08A-CC88-20A0-D8DD4E087D2E}"/>
+              </a:ext>
+            </a:extLst>
+          </p:cNvPr>
+          <p:cNvSpPr>
+            <a:spLocks noGrp="1"/>
+          </p:cNvSpPr>
+          <p:nvPr>
+            <p:ph idx="1"/>
+          </p:nvPr>
+        </p:nvSpPr>
+        <p:spPr>
+          <a:xfrm>
+            <a:off x="838200" y="2766218"/>
+            <a:ext cx="10515600" cy="1325563"/>
+          </a:xfrm>
+        </p:spPr>
+        <p:txBody>
+          <a:bodyPr/>
+          <a:lstStyle/>
+          <a:p>
+            <a:pPr marL="0" indent="0">
+              <a:buNone/>
+            </a:pPr>
+            <a:r>
+              <a:rPr lang="en-US" dirty="0"/>
+              <a:t>Create a simple quiz program that asks the user multiple-choice questions and provides a score at the end.</a:t>
+            </a:r>
+          </a:p>
+        </p:txBody>
+      </p:sp>
+    </p:spTree>
+    <p:extLst>
+      <p:ext uri="{BB962C8B-B14F-4D97-AF65-F5344CB8AC3E}">
+        <p14:creationId xmlns:p14="http://schemas.microsoft.com/office/powerpoint/2010/main" val="698464566"/>
       </p:ext>
     </p:extLst>
   </p:cSld>

</xml_diff>